<commit_message>
Update flowchart with FAIL SAFE
</commit_message>
<xml_diff>
--- a/docs/services_flowchart.pptx
+++ b/docs/services_flowchart.pptx
@@ -243,7 +243,7 @@
           <a:p>
             <a:fld id="{698FBB98-B945-4577-894A-FA2C9592D54D}" type="datetimeFigureOut">
               <a:rPr lang="en-NL" smtClean="0"/>
-              <a:t>31/08/2022</a:t>
+              <a:t>5/22/23</a:t>
             </a:fld>
             <a:endParaRPr lang="en-NL"/>
           </a:p>
@@ -413,7 +413,7 @@
           <a:p>
             <a:fld id="{698FBB98-B945-4577-894A-FA2C9592D54D}" type="datetimeFigureOut">
               <a:rPr lang="en-NL" smtClean="0"/>
-              <a:t>31/08/2022</a:t>
+              <a:t>5/22/23</a:t>
             </a:fld>
             <a:endParaRPr lang="en-NL"/>
           </a:p>
@@ -593,7 +593,7 @@
           <a:p>
             <a:fld id="{698FBB98-B945-4577-894A-FA2C9592D54D}" type="datetimeFigureOut">
               <a:rPr lang="en-NL" smtClean="0"/>
-              <a:t>31/08/2022</a:t>
+              <a:t>5/22/23</a:t>
             </a:fld>
             <a:endParaRPr lang="en-NL"/>
           </a:p>
@@ -763,7 +763,7 @@
           <a:p>
             <a:fld id="{698FBB98-B945-4577-894A-FA2C9592D54D}" type="datetimeFigureOut">
               <a:rPr lang="en-NL" smtClean="0"/>
-              <a:t>31/08/2022</a:t>
+              <a:t>5/22/23</a:t>
             </a:fld>
             <a:endParaRPr lang="en-NL"/>
           </a:p>
@@ -1007,7 +1007,7 @@
           <a:p>
             <a:fld id="{698FBB98-B945-4577-894A-FA2C9592D54D}" type="datetimeFigureOut">
               <a:rPr lang="en-NL" smtClean="0"/>
-              <a:t>31/08/2022</a:t>
+              <a:t>5/22/23</a:t>
             </a:fld>
             <a:endParaRPr lang="en-NL"/>
           </a:p>
@@ -1239,7 +1239,7 @@
           <a:p>
             <a:fld id="{698FBB98-B945-4577-894A-FA2C9592D54D}" type="datetimeFigureOut">
               <a:rPr lang="en-NL" smtClean="0"/>
-              <a:t>31/08/2022</a:t>
+              <a:t>5/22/23</a:t>
             </a:fld>
             <a:endParaRPr lang="en-NL"/>
           </a:p>
@@ -1606,7 +1606,7 @@
           <a:p>
             <a:fld id="{698FBB98-B945-4577-894A-FA2C9592D54D}" type="datetimeFigureOut">
               <a:rPr lang="en-NL" smtClean="0"/>
-              <a:t>31/08/2022</a:t>
+              <a:t>5/22/23</a:t>
             </a:fld>
             <a:endParaRPr lang="en-NL"/>
           </a:p>
@@ -1724,7 +1724,7 @@
           <a:p>
             <a:fld id="{698FBB98-B945-4577-894A-FA2C9592D54D}" type="datetimeFigureOut">
               <a:rPr lang="en-NL" smtClean="0"/>
-              <a:t>31/08/2022</a:t>
+              <a:t>5/22/23</a:t>
             </a:fld>
             <a:endParaRPr lang="en-NL"/>
           </a:p>
@@ -1819,7 +1819,7 @@
           <a:p>
             <a:fld id="{698FBB98-B945-4577-894A-FA2C9592D54D}" type="datetimeFigureOut">
               <a:rPr lang="en-NL" smtClean="0"/>
-              <a:t>31/08/2022</a:t>
+              <a:t>5/22/23</a:t>
             </a:fld>
             <a:endParaRPr lang="en-NL"/>
           </a:p>
@@ -2096,7 +2096,7 @@
           <a:p>
             <a:fld id="{698FBB98-B945-4577-894A-FA2C9592D54D}" type="datetimeFigureOut">
               <a:rPr lang="en-NL" smtClean="0"/>
-              <a:t>31/08/2022</a:t>
+              <a:t>5/22/23</a:t>
             </a:fld>
             <a:endParaRPr lang="en-NL"/>
           </a:p>
@@ -2353,7 +2353,7 @@
           <a:p>
             <a:fld id="{698FBB98-B945-4577-894A-FA2C9592D54D}" type="datetimeFigureOut">
               <a:rPr lang="en-NL" smtClean="0"/>
-              <a:t>31/08/2022</a:t>
+              <a:t>5/22/23</a:t>
             </a:fld>
             <a:endParaRPr lang="en-NL"/>
           </a:p>
@@ -2566,7 +2566,7 @@
           <a:p>
             <a:fld id="{698FBB98-B945-4577-894A-FA2C9592D54D}" type="datetimeFigureOut">
               <a:rPr lang="en-NL" smtClean="0"/>
-              <a:t>31/08/2022</a:t>
+              <a:t>5/22/23</a:t>
             </a:fld>
             <a:endParaRPr lang="en-NL"/>
           </a:p>
@@ -2985,7 +2985,7 @@
         </p:nvSpPr>
         <p:spPr>
           <a:xfrm>
-            <a:off x="1451292" y="1029244"/>
+            <a:off x="1149735" y="1029244"/>
             <a:ext cx="2021748" cy="604008"/>
           </a:xfrm>
           <a:prstGeom prst="flowChartProcess">
@@ -3042,7 +3042,7 @@
         </p:nvSpPr>
         <p:spPr>
           <a:xfrm>
-            <a:off x="1451292" y="2008255"/>
+            <a:off x="1149735" y="2008255"/>
             <a:ext cx="2021748" cy="604008"/>
           </a:xfrm>
           <a:prstGeom prst="flowChartProcess">
@@ -3098,7 +3098,7 @@
         </p:nvSpPr>
         <p:spPr>
           <a:xfrm>
-            <a:off x="1451292" y="2983637"/>
+            <a:off x="1149735" y="2983637"/>
             <a:ext cx="2021748" cy="604008"/>
           </a:xfrm>
           <a:prstGeom prst="flowChartProcess">
@@ -3155,7 +3155,7 @@
         </p:nvSpPr>
         <p:spPr>
           <a:xfrm>
-            <a:off x="1451292" y="3959282"/>
+            <a:off x="1149735" y="3959282"/>
             <a:ext cx="2021748" cy="673378"/>
           </a:xfrm>
           <a:prstGeom prst="flowChartProcess">
@@ -3219,7 +3219,7 @@
         </p:nvSpPr>
         <p:spPr>
           <a:xfrm>
-            <a:off x="1451292" y="5189025"/>
+            <a:off x="1149735" y="5189025"/>
             <a:ext cx="2021748" cy="604008"/>
           </a:xfrm>
           <a:prstGeom prst="flowChartProcess">
@@ -3279,7 +3279,7 @@
         </p:nvCxnSpPr>
         <p:spPr>
           <a:xfrm>
-            <a:off x="2462166" y="1633253"/>
+            <a:off x="2160609" y="1633253"/>
             <a:ext cx="0" cy="375003"/>
           </a:xfrm>
           <a:prstGeom prst="straightConnector1">
@@ -3322,7 +3322,7 @@
         </p:nvCxnSpPr>
         <p:spPr>
           <a:xfrm>
-            <a:off x="2462166" y="2612263"/>
+            <a:off x="2160609" y="2612263"/>
             <a:ext cx="0" cy="371374"/>
           </a:xfrm>
           <a:prstGeom prst="straightConnector1">
@@ -3365,7 +3365,7 @@
         </p:nvCxnSpPr>
         <p:spPr>
           <a:xfrm>
-            <a:off x="2462166" y="3587646"/>
+            <a:off x="2160609" y="3587646"/>
             <a:ext cx="0" cy="371637"/>
           </a:xfrm>
           <a:prstGeom prst="straightConnector1">
@@ -3408,7 +3408,7 @@
         </p:nvCxnSpPr>
         <p:spPr>
           <a:xfrm>
-            <a:off x="2462166" y="4632661"/>
+            <a:off x="2160609" y="4632661"/>
             <a:ext cx="0" cy="556365"/>
           </a:xfrm>
           <a:prstGeom prst="straightConnector1">
@@ -3447,7 +3447,7 @@
         </p:nvSpPr>
         <p:spPr>
           <a:xfrm>
-            <a:off x="4054766" y="3958756"/>
+            <a:off x="3753209" y="3958756"/>
             <a:ext cx="2021748" cy="673378"/>
           </a:xfrm>
           <a:prstGeom prst="flowChartProcess">
@@ -3508,7 +3508,7 @@
         </p:nvCxnSpPr>
         <p:spPr>
           <a:xfrm flipV="1">
-            <a:off x="6076515" y="4295181"/>
+            <a:off x="5774958" y="4295181"/>
             <a:ext cx="387757" cy="265"/>
           </a:xfrm>
           <a:prstGeom prst="straightConnector1">
@@ -3551,7 +3551,7 @@
         </p:nvCxnSpPr>
         <p:spPr>
           <a:xfrm flipV="1">
-            <a:off x="3473040" y="4295445"/>
+            <a:off x="3171483" y="4295445"/>
             <a:ext cx="581726" cy="526"/>
           </a:xfrm>
           <a:prstGeom prst="straightConnector1">
@@ -3595,7 +3595,7 @@
         </p:nvCxnSpPr>
         <p:spPr>
           <a:xfrm flipV="1">
-            <a:off x="3473041" y="4631869"/>
+            <a:off x="3171484" y="4631869"/>
             <a:ext cx="4002105" cy="859160"/>
           </a:xfrm>
           <a:prstGeom prst="bentConnector2">
@@ -3638,7 +3638,7 @@
         </p:nvCxnSpPr>
         <p:spPr>
           <a:xfrm>
-            <a:off x="3473041" y="3285641"/>
+            <a:off x="3171484" y="3285641"/>
             <a:ext cx="4002105" cy="672850"/>
           </a:xfrm>
           <a:prstGeom prst="bentConnector2">
@@ -3681,7 +3681,7 @@
         </p:nvCxnSpPr>
         <p:spPr>
           <a:xfrm>
-            <a:off x="3473041" y="2310259"/>
+            <a:off x="3171484" y="2310259"/>
             <a:ext cx="4002105" cy="1648232"/>
           </a:xfrm>
           <a:prstGeom prst="bentConnector2">
@@ -3724,7 +3724,7 @@
         </p:nvCxnSpPr>
         <p:spPr>
           <a:xfrm rot="5400000" flipH="1">
-            <a:off x="80272" y="3411139"/>
+            <a:off x="-221285" y="3411139"/>
             <a:ext cx="4763789" cy="12700"/>
           </a:xfrm>
           <a:prstGeom prst="bentConnector5">
@@ -3767,7 +3767,7 @@
         </p:nvSpPr>
         <p:spPr>
           <a:xfrm>
-            <a:off x="6464271" y="3958491"/>
+            <a:off x="6162714" y="3958491"/>
             <a:ext cx="2021748" cy="673378"/>
           </a:xfrm>
           <a:prstGeom prst="flowChartProcess">
@@ -3828,7 +3828,7 @@
         </p:nvCxnSpPr>
         <p:spPr>
           <a:xfrm rot="5400000" flipH="1" flipV="1">
-            <a:off x="4968260" y="2125776"/>
+            <a:off x="4666703" y="2125776"/>
             <a:ext cx="791" cy="5012979"/>
           </a:xfrm>
           <a:prstGeom prst="bentConnector3">
@@ -3873,13 +3873,205 @@
         </p:nvCxnSpPr>
         <p:spPr>
           <a:xfrm flipH="1" flipV="1">
-            <a:off x="2462167" y="2008256"/>
+            <a:off x="2160610" y="2008256"/>
             <a:ext cx="6023853" cy="2286925"/>
           </a:xfrm>
           <a:prstGeom prst="bentConnector4">
             <a:avLst>
               <a:gd name="adj1" fmla="val -3795"/>
               <a:gd name="adj2" fmla="val 109996"/>
+            </a:avLst>
+          </a:prstGeom>
+          <a:ln w="28575">
+            <a:tailEnd type="triangle" w="lg" len="lg"/>
+          </a:ln>
+        </p:spPr>
+        <p:style>
+          <a:lnRef idx="1">
+            <a:schemeClr val="dk1"/>
+          </a:lnRef>
+          <a:fillRef idx="0">
+            <a:schemeClr val="dk1"/>
+          </a:fillRef>
+          <a:effectRef idx="0">
+            <a:schemeClr val="dk1"/>
+          </a:effectRef>
+          <a:fontRef idx="minor">
+            <a:schemeClr val="tx1"/>
+          </a:fontRef>
+        </p:style>
+      </p:cxnSp>
+      <p:sp>
+        <p:nvSpPr>
+          <p:cNvPr id="2" name="Flowchart: Process 238">
+            <a:extLst>
+              <a:ext uri="{FF2B5EF4-FFF2-40B4-BE49-F238E27FC236}">
+                <a16:creationId xmlns:a16="http://schemas.microsoft.com/office/drawing/2014/main" id="{3CF1582F-9FC9-5B55-8337-F20E5652A9F4}"/>
+              </a:ext>
+            </a:extLst>
+          </p:cNvPr>
+          <p:cNvSpPr/>
+          <p:nvPr/>
+        </p:nvSpPr>
+        <p:spPr>
+          <a:xfrm>
+            <a:off x="6162714" y="657870"/>
+            <a:ext cx="2021748" cy="673378"/>
+          </a:xfrm>
+          <a:prstGeom prst="flowChartProcess">
+            <a:avLst/>
+          </a:prstGeom>
+        </p:spPr>
+        <p:style>
+          <a:lnRef idx="2">
+            <a:schemeClr val="accent6">
+              <a:shade val="50000"/>
+            </a:schemeClr>
+          </a:lnRef>
+          <a:fillRef idx="1">
+            <a:schemeClr val="accent6"/>
+          </a:fillRef>
+          <a:effectRef idx="0">
+            <a:schemeClr val="accent6"/>
+          </a:effectRef>
+          <a:fontRef idx="minor">
+            <a:schemeClr val="lt1"/>
+          </a:fontRef>
+        </p:style>
+        <p:txBody>
+          <a:bodyPr rtlCol="0" anchor="ctr"/>
+          <a:lstStyle/>
+          <a:p>
+            <a:pPr algn="ctr"/>
+            <a:r>
+              <a:rPr lang="en-US" dirty="0"/>
+              <a:t>FAIL_SAFE</a:t>
+            </a:r>
+          </a:p>
+          <a:p>
+            <a:pPr algn="ctr"/>
+            <a:r>
+              <a:rPr lang="en-US" sz="1050" dirty="0"/>
+              <a:t>Unsafe testbed closed the service</a:t>
+            </a:r>
+            <a:endParaRPr lang="en-NL" sz="1050" dirty="0"/>
+          </a:p>
+        </p:txBody>
+      </p:sp>
+      <p:cxnSp>
+        <p:nvCxnSpPr>
+          <p:cNvPr id="3" name="Connector: Elbow 125">
+            <a:extLst>
+              <a:ext uri="{FF2B5EF4-FFF2-40B4-BE49-F238E27FC236}">
+                <a16:creationId xmlns:a16="http://schemas.microsoft.com/office/drawing/2014/main" id="{788D8E7D-2393-F012-DBFD-C8B6FA2094A4}"/>
+              </a:ext>
+            </a:extLst>
+          </p:cNvPr>
+          <p:cNvCxnSpPr>
+            <a:cxnSpLocks/>
+            <a:stCxn id="12" idx="3"/>
+            <a:endCxn id="2" idx="3"/>
+          </p:cNvCxnSpPr>
+          <p:nvPr/>
+        </p:nvCxnSpPr>
+        <p:spPr>
+          <a:xfrm flipV="1">
+            <a:off x="3171483" y="994559"/>
+            <a:ext cx="5012979" cy="4496470"/>
+          </a:xfrm>
+          <a:prstGeom prst="bentConnector3">
+            <a:avLst>
+              <a:gd name="adj1" fmla="val 112516"/>
+            </a:avLst>
+          </a:prstGeom>
+          <a:ln w="28575">
+            <a:tailEnd type="triangle" w="lg" len="lg"/>
+          </a:ln>
+        </p:spPr>
+        <p:style>
+          <a:lnRef idx="1">
+            <a:schemeClr val="dk1"/>
+          </a:lnRef>
+          <a:fillRef idx="0">
+            <a:schemeClr val="dk1"/>
+          </a:fillRef>
+          <a:effectRef idx="0">
+            <a:schemeClr val="dk1"/>
+          </a:effectRef>
+          <a:fontRef idx="minor">
+            <a:schemeClr val="tx1"/>
+          </a:fontRef>
+        </p:style>
+      </p:cxnSp>
+      <p:cxnSp>
+        <p:nvCxnSpPr>
+          <p:cNvPr id="13" name="Connector: Elbow 131">
+            <a:extLst>
+              <a:ext uri="{FF2B5EF4-FFF2-40B4-BE49-F238E27FC236}">
+                <a16:creationId xmlns:a16="http://schemas.microsoft.com/office/drawing/2014/main" id="{5116C40A-CA8A-3E00-752B-A27E206C7A68}"/>
+              </a:ext>
+            </a:extLst>
+          </p:cNvPr>
+          <p:cNvCxnSpPr>
+            <a:cxnSpLocks/>
+            <a:stCxn id="6" idx="3"/>
+            <a:endCxn id="2" idx="1"/>
+          </p:cNvCxnSpPr>
+          <p:nvPr/>
+        </p:nvCxnSpPr>
+        <p:spPr>
+          <a:xfrm flipV="1">
+            <a:off x="3171483" y="994559"/>
+            <a:ext cx="2991231" cy="1315700"/>
+          </a:xfrm>
+          <a:prstGeom prst="bentConnector3">
+            <a:avLst>
+              <a:gd name="adj1" fmla="val 50000"/>
+            </a:avLst>
+          </a:prstGeom>
+          <a:ln w="28575">
+            <a:tailEnd type="triangle" w="lg" len="lg"/>
+          </a:ln>
+        </p:spPr>
+        <p:style>
+          <a:lnRef idx="1">
+            <a:schemeClr val="dk1"/>
+          </a:lnRef>
+          <a:fillRef idx="0">
+            <a:schemeClr val="dk1"/>
+          </a:fillRef>
+          <a:effectRef idx="0">
+            <a:schemeClr val="dk1"/>
+          </a:effectRef>
+          <a:fontRef idx="minor">
+            <a:schemeClr val="tx1"/>
+          </a:fontRef>
+        </p:style>
+      </p:cxnSp>
+      <p:cxnSp>
+        <p:nvCxnSpPr>
+          <p:cNvPr id="19" name="Connector: Elbow 131">
+            <a:extLst>
+              <a:ext uri="{FF2B5EF4-FFF2-40B4-BE49-F238E27FC236}">
+                <a16:creationId xmlns:a16="http://schemas.microsoft.com/office/drawing/2014/main" id="{9CB2863B-174B-ACEA-E524-74D92A4AD7E2}"/>
+              </a:ext>
+            </a:extLst>
+          </p:cNvPr>
+          <p:cNvCxnSpPr>
+            <a:cxnSpLocks/>
+            <a:stCxn id="2" idx="2"/>
+            <a:endCxn id="6" idx="0"/>
+          </p:cNvCxnSpPr>
+          <p:nvPr/>
+        </p:nvCxnSpPr>
+        <p:spPr>
+          <a:xfrm rot="5400000">
+            <a:off x="4328596" y="-836738"/>
+            <a:ext cx="677007" cy="5012979"/>
+          </a:xfrm>
+          <a:prstGeom prst="bentConnector3">
+            <a:avLst>
+              <a:gd name="adj1" fmla="val 65806"/>
             </a:avLst>
           </a:prstGeom>
           <a:ln w="28575">

</xml_diff>